<commit_message>
Added memes to the slides.
</commit_message>
<xml_diff>
--- a/Introduction to Rails.pptx
+++ b/Introduction to Rails.pptx
@@ -1071,7 +1071,7 @@
   <p:cSld>
     <p:spTree>
       <p:nvGrpSpPr>
-        <p:cNvPr id="82" name="Shape 82"/>
+        <p:cNvPr id="83" name="Shape 83"/>
         <p:cNvGrpSpPr/>
         <p:nvPr/>
       </p:nvGrpSpPr>
@@ -1085,7 +1085,7 @@
       </p:grpSpPr>
       <p:sp>
         <p:nvSpPr>
-          <p:cNvPr id="83" name="Google Shape;83;g4d96672a64_0_17:notes"/>
+          <p:cNvPr id="84" name="Google Shape;84;g4d96672a64_0_17:notes"/>
           <p:cNvSpPr/>
           <p:nvPr>
             <p:ph idx="2" type="sldImg"/>
@@ -1120,7 +1120,7 @@
       </p:sp>
       <p:sp>
         <p:nvSpPr>
-          <p:cNvPr id="84" name="Google Shape;84;g4d96672a64_0_17:notes"/>
+          <p:cNvPr id="85" name="Google Shape;85;g4d96672a64_0_17:notes"/>
           <p:cNvSpPr txBox="1"/>
           <p:nvPr>
             <p:ph idx="1" type="body"/>
@@ -1264,7 +1264,7 @@
   <p:cSld>
     <p:spTree>
       <p:nvGrpSpPr>
-        <p:cNvPr id="88" name="Shape 88"/>
+        <p:cNvPr id="90" name="Shape 90"/>
         <p:cNvGrpSpPr/>
         <p:nvPr/>
       </p:nvGrpSpPr>
@@ -1278,7 +1278,7 @@
       </p:grpSpPr>
       <p:sp>
         <p:nvSpPr>
-          <p:cNvPr id="89" name="Google Shape;89;g7e74342490_0_0:notes"/>
+          <p:cNvPr id="91" name="Google Shape;91;g7e74342490_0_0:notes"/>
           <p:cNvSpPr/>
           <p:nvPr>
             <p:ph idx="2" type="sldImg"/>
@@ -1313,7 +1313,7 @@
       </p:sp>
       <p:sp>
         <p:nvSpPr>
-          <p:cNvPr id="90" name="Google Shape;90;g7e74342490_0_0:notes"/>
+          <p:cNvPr id="92" name="Google Shape;92;g7e74342490_0_0:notes"/>
           <p:cNvSpPr txBox="1"/>
           <p:nvPr>
             <p:ph idx="1" type="body"/>
@@ -1549,7 +1549,7 @@
   <p:cSld>
     <p:spTree>
       <p:nvGrpSpPr>
-        <p:cNvPr id="94" name="Shape 94"/>
+        <p:cNvPr id="97" name="Shape 97"/>
         <p:cNvGrpSpPr/>
         <p:nvPr/>
       </p:nvGrpSpPr>
@@ -1563,7 +1563,7 @@
       </p:grpSpPr>
       <p:sp>
         <p:nvSpPr>
-          <p:cNvPr id="95" name="Google Shape;95;g7e74342490_0_17:notes"/>
+          <p:cNvPr id="98" name="Google Shape;98;g7e74342490_0_17:notes"/>
           <p:cNvSpPr/>
           <p:nvPr>
             <p:ph idx="2" type="sldImg"/>
@@ -1598,7 +1598,7 @@
       </p:sp>
       <p:sp>
         <p:nvSpPr>
-          <p:cNvPr id="96" name="Google Shape;96;g7e74342490_0_17:notes"/>
+          <p:cNvPr id="99" name="Google Shape;99;g7e74342490_0_17:notes"/>
           <p:cNvSpPr txBox="1"/>
           <p:nvPr>
             <p:ph idx="1" type="body"/>
@@ -1833,7 +1833,7 @@
   <p:cSld>
     <p:spTree>
       <p:nvGrpSpPr>
-        <p:cNvPr id="101" name="Shape 101"/>
+        <p:cNvPr id="104" name="Shape 104"/>
         <p:cNvGrpSpPr/>
         <p:nvPr/>
       </p:nvGrpSpPr>
@@ -1847,7 +1847,7 @@
       </p:grpSpPr>
       <p:sp>
         <p:nvSpPr>
-          <p:cNvPr id="102" name="Google Shape;102;g710fedfafa_0_4:notes"/>
+          <p:cNvPr id="105" name="Google Shape;105;g710fedfafa_0_4:notes"/>
           <p:cNvSpPr/>
           <p:nvPr>
             <p:ph idx="2" type="sldImg"/>
@@ -1882,7 +1882,7 @@
       </p:sp>
       <p:sp>
         <p:nvSpPr>
-          <p:cNvPr id="103" name="Google Shape;103;g710fedfafa_0_4:notes"/>
+          <p:cNvPr id="106" name="Google Shape;106;g710fedfafa_0_4:notes"/>
           <p:cNvSpPr txBox="1"/>
           <p:nvPr>
             <p:ph idx="1" type="body"/>
@@ -7861,21 +7861,6 @@
               <a:buNone/>
             </a:pPr>
             <a:r>
-              <a:t/>
-            </a:r>
-            <a:endParaRPr/>
-          </a:p>
-          <a:p>
-            <a:pPr indent="0" lvl="0" marL="0" rtl="0" algn="l">
-              <a:spcBef>
-                <a:spcPts val="1600"/>
-              </a:spcBef>
-              <a:spcAft>
-                <a:spcPts val="0"/>
-              </a:spcAft>
-              <a:buNone/>
-            </a:pPr>
-            <a:r>
               <a:rPr lang="en"/>
               <a:t>“</a:t>
             </a:r>
@@ -7953,6 +7938,34 @@
           </a:p>
         </p:txBody>
       </p:sp>
+      <p:pic>
+        <p:nvPicPr>
+          <p:cNvPr id="82" name="Google Shape;82;p15"/>
+          <p:cNvPicPr preferRelativeResize="0"/>
+          <p:nvPr/>
+        </p:nvPicPr>
+        <p:blipFill>
+          <a:blip r:embed="rId4">
+            <a:alphaModFix/>
+          </a:blip>
+          <a:stretch>
+            <a:fillRect/>
+          </a:stretch>
+        </p:blipFill>
+        <p:spPr>
+          <a:xfrm>
+            <a:off x="6143275" y="2549625"/>
+            <a:ext cx="2077574" cy="2019399"/>
+          </a:xfrm>
+          <a:prstGeom prst="rect">
+            <a:avLst/>
+          </a:prstGeom>
+          <a:noFill/>
+          <a:ln>
+            <a:noFill/>
+          </a:ln>
+        </p:spPr>
+      </p:pic>
     </p:spTree>
   </p:cSld>
   <p:clrMapOvr>
@@ -7966,7 +7979,7 @@
   <p:cSld>
     <p:spTree>
       <p:nvGrpSpPr>
-        <p:cNvPr id="85" name="Shape 85"/>
+        <p:cNvPr id="86" name="Shape 86"/>
         <p:cNvGrpSpPr/>
         <p:nvPr/>
       </p:nvGrpSpPr>
@@ -7980,7 +7993,7 @@
       </p:grpSpPr>
       <p:sp>
         <p:nvSpPr>
-          <p:cNvPr id="86" name="Google Shape;86;p16"/>
+          <p:cNvPr id="87" name="Google Shape;87;p16"/>
           <p:cNvSpPr txBox="1"/>
           <p:nvPr>
             <p:ph type="title"/>
@@ -8035,7 +8048,7 @@
       </p:sp>
       <p:sp>
         <p:nvSpPr>
-          <p:cNvPr id="87" name="Google Shape;87;p16"/>
+          <p:cNvPr id="88" name="Google Shape;88;p16"/>
           <p:cNvSpPr txBox="1"/>
           <p:nvPr>
             <p:ph idx="1" type="body"/>
@@ -8218,6 +8231,34 @@
           </a:p>
         </p:txBody>
       </p:sp>
+      <p:pic>
+        <p:nvPicPr>
+          <p:cNvPr id="89" name="Google Shape;89;p16"/>
+          <p:cNvPicPr preferRelativeResize="0"/>
+          <p:nvPr/>
+        </p:nvPicPr>
+        <p:blipFill>
+          <a:blip r:embed="rId3">
+            <a:alphaModFix/>
+          </a:blip>
+          <a:stretch>
+            <a:fillRect/>
+          </a:stretch>
+        </p:blipFill>
+        <p:spPr>
+          <a:xfrm>
+            <a:off x="5422600" y="1937147"/>
+            <a:ext cx="3149801" cy="2395325"/>
+          </a:xfrm>
+          <a:prstGeom prst="rect">
+            <a:avLst/>
+          </a:prstGeom>
+          <a:noFill/>
+          <a:ln>
+            <a:noFill/>
+          </a:ln>
+        </p:spPr>
+      </p:pic>
     </p:spTree>
   </p:cSld>
   <p:clrMapOvr>
@@ -8231,7 +8272,7 @@
   <p:cSld>
     <p:spTree>
       <p:nvGrpSpPr>
-        <p:cNvPr id="91" name="Shape 91"/>
+        <p:cNvPr id="93" name="Shape 93"/>
         <p:cNvGrpSpPr/>
         <p:nvPr/>
       </p:nvGrpSpPr>
@@ -8245,7 +8286,7 @@
       </p:grpSpPr>
       <p:sp>
         <p:nvSpPr>
-          <p:cNvPr id="92" name="Google Shape;92;p17"/>
+          <p:cNvPr id="94" name="Google Shape;94;p17"/>
           <p:cNvSpPr txBox="1"/>
           <p:nvPr>
             <p:ph type="title"/>
@@ -8285,7 +8326,7 @@
       </p:sp>
       <p:sp>
         <p:nvSpPr>
-          <p:cNvPr id="93" name="Google Shape;93;p17"/>
+          <p:cNvPr id="95" name="Google Shape;95;p17"/>
           <p:cNvSpPr txBox="1"/>
           <p:nvPr>
             <p:ph idx="1" type="body"/>
@@ -8441,6 +8482,34 @@
           </a:p>
         </p:txBody>
       </p:sp>
+      <p:pic>
+        <p:nvPicPr>
+          <p:cNvPr id="96" name="Google Shape;96;p17"/>
+          <p:cNvPicPr preferRelativeResize="0"/>
+          <p:nvPr/>
+        </p:nvPicPr>
+        <p:blipFill>
+          <a:blip r:embed="rId3">
+            <a:alphaModFix/>
+          </a:blip>
+          <a:stretch>
+            <a:fillRect/>
+          </a:stretch>
+        </p:blipFill>
+        <p:spPr>
+          <a:xfrm>
+            <a:off x="6863350" y="445025"/>
+            <a:ext cx="1968950" cy="1968950"/>
+          </a:xfrm>
+          <a:prstGeom prst="rect">
+            <a:avLst/>
+          </a:prstGeom>
+          <a:noFill/>
+          <a:ln>
+            <a:noFill/>
+          </a:ln>
+        </p:spPr>
+      </p:pic>
     </p:spTree>
   </p:cSld>
   <p:clrMapOvr>
@@ -8454,7 +8523,7 @@
   <p:cSld>
     <p:spTree>
       <p:nvGrpSpPr>
-        <p:cNvPr id="97" name="Shape 97"/>
+        <p:cNvPr id="100" name="Shape 100"/>
         <p:cNvGrpSpPr/>
         <p:nvPr/>
       </p:nvGrpSpPr>
@@ -8468,7 +8537,7 @@
       </p:grpSpPr>
       <p:sp>
         <p:nvSpPr>
-          <p:cNvPr id="98" name="Google Shape;98;p18"/>
+          <p:cNvPr id="101" name="Google Shape;101;p18"/>
           <p:cNvSpPr txBox="1"/>
           <p:nvPr>
             <p:ph type="title"/>
@@ -8508,7 +8577,7 @@
       </p:sp>
       <p:sp>
         <p:nvSpPr>
-          <p:cNvPr id="99" name="Google Shape;99;p18"/>
+          <p:cNvPr id="102" name="Google Shape;102;p18"/>
           <p:cNvSpPr txBox="1"/>
           <p:nvPr>
             <p:ph idx="1" type="body"/>
@@ -8590,7 +8659,7 @@
       </p:sp>
       <p:pic>
         <p:nvPicPr>
-          <p:cNvPr id="100" name="Google Shape;100;p18"/>
+          <p:cNvPr id="103" name="Google Shape;103;p18"/>
           <p:cNvPicPr preferRelativeResize="0"/>
           <p:nvPr/>
         </p:nvPicPr>
@@ -8629,7 +8698,7 @@
   <p:cSld>
     <p:spTree>
       <p:nvGrpSpPr>
-        <p:cNvPr id="104" name="Shape 104"/>
+        <p:cNvPr id="107" name="Shape 107"/>
         <p:cNvGrpSpPr/>
         <p:nvPr/>
       </p:nvGrpSpPr>
@@ -8643,7 +8712,7 @@
       </p:grpSpPr>
       <p:sp>
         <p:nvSpPr>
-          <p:cNvPr id="105" name="Google Shape;105;p19"/>
+          <p:cNvPr id="108" name="Google Shape;108;p19"/>
           <p:cNvSpPr txBox="1"/>
           <p:nvPr>
             <p:ph type="title"/>
@@ -8683,7 +8752,7 @@
       </p:sp>
       <p:sp>
         <p:nvSpPr>
-          <p:cNvPr id="106" name="Google Shape;106;p19"/>
+          <p:cNvPr id="109" name="Google Shape;109;p19"/>
           <p:cNvSpPr txBox="1"/>
           <p:nvPr>
             <p:ph idx="1" type="body"/>
@@ -8692,7 +8761,7 @@
         <p:spPr>
           <a:xfrm>
             <a:off x="311700" y="1266325"/>
-            <a:ext cx="8520600" cy="3302700"/>
+            <a:ext cx="4791900" cy="3302700"/>
           </a:xfrm>
           <a:prstGeom prst="rect">
             <a:avLst/>
@@ -8717,7 +8786,33 @@
               <a:buNone/>
             </a:pPr>
             <a:r>
-              <a:rPr lang="en" sz="2700">
+              <a:t/>
+            </a:r>
+            <a:endParaRPr sz="1200">
+              <a:solidFill>
+                <a:srgbClr val="33444C"/>
+              </a:solidFill>
+              <a:latin typeface="Arial"/>
+              <a:ea typeface="Arial"/>
+              <a:cs typeface="Arial"/>
+              <a:sym typeface="Arial"/>
+            </a:endParaRPr>
+          </a:p>
+          <a:p>
+            <a:pPr indent="0" lvl="0" marL="0" rtl="0" algn="l">
+              <a:lnSpc>
+                <a:spcPct val="133333"/>
+              </a:lnSpc>
+              <a:spcBef>
+                <a:spcPts val="1500"/>
+              </a:spcBef>
+              <a:spcAft>
+                <a:spcPts val="0"/>
+              </a:spcAft>
+              <a:buNone/>
+            </a:pPr>
+            <a:r>
+              <a:rPr lang="en" sz="2000">
                 <a:solidFill>
                   <a:srgbClr val="33444C"/>
                 </a:solidFill>
@@ -8729,10 +8824,10 @@
                 <a:cs typeface="Arial"/>
                 <a:sym typeface="Arial"/>
               </a:rPr>
-              <a:t>Rails Template</a:t>
+              <a:t>Rails Getting Started</a:t>
             </a:r>
             <a:br>
-              <a:rPr lang="en" sz="2700">
+              <a:rPr lang="en" sz="2000">
                 <a:solidFill>
                   <a:srgbClr val="33444C"/>
                 </a:solidFill>
@@ -8748,17 +8843,23 @@
             <a:r>
               <a:rPr lang="en" sz="1200" u="sng">
                 <a:solidFill>
-                  <a:schemeClr val="hlink"/>
+                  <a:schemeClr val="accent5"/>
                 </a:solidFill>
                 <a:latin typeface="Arial"/>
                 <a:ea typeface="Arial"/>
                 <a:cs typeface="Arial"/>
                 <a:sym typeface="Arial"/>
-                <a:hlinkClick r:id="rId3"/>
+                <a:hlinkClick r:id="rId3">
+                  <a:extLst>
+                    <a:ext uri="{A12FA001-AC4F-418D-AE19-62706E023703}">
+                      <ahyp:hlinkClr val="tx"/>
+                    </a:ext>
+                  </a:extLst>
+                </a:hlinkClick>
               </a:rPr>
-              <a:t>https://github.com/saturdaymp-examples/rails-template</a:t>
-            </a:r>
-            <a:endParaRPr sz="1200">
+              <a:t>https://guides.rubyonrails.org/getting_started.html</a:t>
+            </a:r>
+            <a:endParaRPr sz="2000">
               <a:solidFill>
                 <a:srgbClr val="33444C"/>
               </a:solidFill>
@@ -8785,46 +8886,64 @@
               <a:buNone/>
             </a:pPr>
             <a:r>
-              <a:rPr lang="en" sz="2700">
+              <a:rPr lang="en" sz="2000">
                 <a:solidFill>
                   <a:srgbClr val="33444C"/>
                 </a:solidFill>
                 <a:highlight>
-                  <a:srgbClr val="FFFFFF"/>
+                  <a:schemeClr val="lt1"/>
                 </a:highlight>
                 <a:latin typeface="Arial"/>
                 <a:ea typeface="Arial"/>
                 <a:cs typeface="Arial"/>
                 <a:sym typeface="Arial"/>
               </a:rPr>
-              <a:t>Rails Getting Started</a:t>
-            </a:r>
-            <a:br>
-              <a:rPr lang="en" sz="2700">
+              <a:t>R</a:t>
+            </a:r>
+            <a:r>
+              <a:rPr lang="en" sz="2000">
                 <a:solidFill>
                   <a:srgbClr val="33444C"/>
                 </a:solidFill>
                 <a:highlight>
-                  <a:srgbClr val="FFFFFF"/>
+                  <a:schemeClr val="lt1"/>
                 </a:highlight>
                 <a:latin typeface="Arial"/>
                 <a:ea typeface="Arial"/>
                 <a:cs typeface="Arial"/>
                 <a:sym typeface="Arial"/>
               </a:rPr>
-            </a:br>
-            <a:r>
-              <a:rPr lang="en" sz="1200" u="sng">
+              <a:t>ails Template</a:t>
+            </a:r>
+            <a:br>
+              <a:rPr lang="en" sz="1200">
                 <a:solidFill>
-                  <a:schemeClr val="hlink"/>
+                  <a:srgbClr val="33444C"/>
                 </a:solidFill>
                 <a:latin typeface="Arial"/>
                 <a:ea typeface="Arial"/>
                 <a:cs typeface="Arial"/>
                 <a:sym typeface="Arial"/>
-                <a:hlinkClick r:id="rId4"/>
               </a:rPr>
-              <a:t>https://guides.rubyonrails.org/getting_started.html</a:t>
+            </a:br>
+            <a:r>
+              <a:rPr lang="en" sz="1200" u="sng">
+                <a:solidFill>
+                  <a:schemeClr val="accent5"/>
+                </a:solidFill>
+                <a:latin typeface="Arial"/>
+                <a:ea typeface="Arial"/>
+                <a:cs typeface="Arial"/>
+                <a:sym typeface="Arial"/>
+                <a:hlinkClick r:id="rId4">
+                  <a:extLst>
+                    <a:ext uri="{A12FA001-AC4F-418D-AE19-62706E023703}">
+                      <ahyp:hlinkClr val="tx"/>
+                    </a:ext>
+                  </a:extLst>
+                </a:hlinkClick>
+              </a:rPr>
+              <a:t>https://github.com/saturdaymp-examples/rails-template</a:t>
             </a:r>
             <a:endParaRPr sz="1200">
               <a:solidFill>
@@ -8850,19 +8969,19 @@
               <a:buNone/>
             </a:pPr>
             <a:r>
-              <a:rPr lang="en" sz="2700">
+              <a:rPr lang="en" sz="2000">
                 <a:solidFill>
                   <a:srgbClr val="33444C"/>
                 </a:solidFill>
                 <a:highlight>
-                  <a:srgbClr val="FFFFFF"/>
+                  <a:schemeClr val="lt1"/>
                 </a:highlight>
                 <a:latin typeface="Arial"/>
                 <a:ea typeface="Arial"/>
                 <a:cs typeface="Arial"/>
                 <a:sym typeface="Arial"/>
               </a:rPr>
-              <a:t>Follow up Questions</a:t>
+              <a:t>Presentation</a:t>
             </a:r>
             <a:br>
               <a:rPr lang="en" sz="2700">
@@ -8870,7 +8989,7 @@
                   <a:srgbClr val="33444C"/>
                 </a:solidFill>
                 <a:highlight>
-                  <a:srgbClr val="FFFFFF"/>
+                  <a:schemeClr val="lt1"/>
                 </a:highlight>
                 <a:latin typeface="Arial"/>
                 <a:ea typeface="Arial"/>
@@ -8883,6 +9002,10 @@
                 <a:solidFill>
                   <a:schemeClr val="accent5"/>
                 </a:solidFill>
+                <a:latin typeface="Arial"/>
+                <a:ea typeface="Arial"/>
+                <a:cs typeface="Arial"/>
+                <a:sym typeface="Arial"/>
                 <a:hlinkClick r:id="rId5">
                   <a:extLst>
                     <a:ext uri="{A12FA001-AC4F-418D-AE19-62706E023703}">
@@ -8891,10 +9014,99 @@
                   </a:extLst>
                 </a:hlinkClick>
               </a:rPr>
+              <a:t>https://github.com/saturdaymp-examples/introduction-to-rails</a:t>
+            </a:r>
+            <a:endParaRPr/>
+          </a:p>
+        </p:txBody>
+      </p:sp>
+      <p:sp>
+        <p:nvSpPr>
+          <p:cNvPr id="110" name="Google Shape;110;p19"/>
+          <p:cNvSpPr txBox="1"/>
+          <p:nvPr/>
+        </p:nvSpPr>
+        <p:spPr>
+          <a:xfrm>
+            <a:off x="4973675" y="1642150"/>
+            <a:ext cx="3969300" cy="3068700"/>
+          </a:xfrm>
+          <a:prstGeom prst="rect">
+            <a:avLst/>
+          </a:prstGeom>
+          <a:noFill/>
+          <a:ln>
+            <a:noFill/>
+          </a:ln>
+        </p:spPr>
+        <p:txBody>
+          <a:bodyPr anchorCtr="0" anchor="t" bIns="91425" lIns="91425" spcFirstLastPara="1" rIns="91425" wrap="square" tIns="91425">
+            <a:noAutofit/>
+          </a:bodyPr>
+          <a:lstStyle/>
+          <a:p>
+            <a:pPr indent="0" lvl="0" marL="0" rtl="0" algn="l">
+              <a:lnSpc>
+                <a:spcPct val="133333"/>
+              </a:lnSpc>
+              <a:spcBef>
+                <a:spcPts val="1500"/>
+              </a:spcBef>
+              <a:spcAft>
+                <a:spcPts val="0"/>
+              </a:spcAft>
+              <a:buNone/>
+            </a:pPr>
+            <a:r>
+              <a:rPr lang="en" sz="2700">
+                <a:solidFill>
+                  <a:srgbClr val="33444C"/>
+                </a:solidFill>
+                <a:highlight>
+                  <a:schemeClr val="lt1"/>
+                </a:highlight>
+              </a:rPr>
+              <a:t>Contact</a:t>
+            </a:r>
+            <a:br>
+              <a:rPr lang="en" sz="2700">
+                <a:solidFill>
+                  <a:srgbClr val="33444C"/>
+                </a:solidFill>
+                <a:highlight>
+                  <a:schemeClr val="lt1"/>
+                </a:highlight>
+              </a:rPr>
+            </a:br>
+            <a:r>
+              <a:rPr lang="en" sz="1200" u="sng">
+                <a:solidFill>
+                  <a:schemeClr val="accent5"/>
+                </a:solidFill>
+                <a:latin typeface="Open Sans"/>
+                <a:ea typeface="Open Sans"/>
+                <a:cs typeface="Open Sans"/>
+                <a:sym typeface="Open Sans"/>
+                <a:hlinkClick r:id="rId6">
+                  <a:extLst>
+                    <a:ext uri="{A12FA001-AC4F-418D-AE19-62706E023703}">
+                      <ahyp:hlinkClr val="tx"/>
+                    </a:ext>
+                  </a:extLst>
+                </a:hlinkClick>
+              </a:rPr>
               <a:t>chris.cumming@satudaymp.com</a:t>
             </a:r>
             <a:r>
-              <a:rPr lang="en" sz="1200"/>
+              <a:rPr lang="en" sz="1200">
+                <a:solidFill>
+                  <a:schemeClr val="dk2"/>
+                </a:solidFill>
+                <a:latin typeface="Open Sans"/>
+                <a:ea typeface="Open Sans"/>
+                <a:cs typeface="Open Sans"/>
+                <a:sym typeface="Open Sans"/>
+              </a:rPr>
               <a:t>     	</a:t>
             </a:r>
             <a:r>
@@ -8902,51 +9114,96 @@
                 <a:solidFill>
                   <a:schemeClr val="accent5"/>
                 </a:solidFill>
-                <a:latin typeface="Arial"/>
-                <a:ea typeface="Arial"/>
-                <a:cs typeface="Arial"/>
-                <a:sym typeface="Arial"/>
               </a:rPr>
-              <a:t>Chris C on Dev Edmonton Slack		</a:t>
+              <a:t>		</a:t>
             </a:r>
             <a:br>
-              <a:rPr lang="en" sz="1200"/>
+              <a:rPr lang="en" sz="1200">
+                <a:solidFill>
+                  <a:schemeClr val="dk2"/>
+                </a:solidFill>
+                <a:latin typeface="Open Sans"/>
+                <a:ea typeface="Open Sans"/>
+                <a:cs typeface="Open Sans"/>
+                <a:sym typeface="Open Sans"/>
+              </a:rPr>
             </a:br>
             <a:r>
               <a:rPr lang="en" sz="1200">
                 <a:solidFill>
                   <a:schemeClr val="accent5"/>
                 </a:solidFill>
-                <a:latin typeface="Arial"/>
-                <a:ea typeface="Arial"/>
-                <a:cs typeface="Arial"/>
-                <a:sym typeface="Arial"/>
               </a:rPr>
-              <a:t>@saturdaymp				</a:t>
+              <a:t>@saturdaymp</a:t>
             </a:r>
             <a:br>
               <a:rPr lang="en" sz="1200">
                 <a:solidFill>
                   <a:schemeClr val="accent5"/>
                 </a:solidFill>
-                <a:latin typeface="Arial"/>
-                <a:ea typeface="Arial"/>
-                <a:cs typeface="Arial"/>
-                <a:sym typeface="Arial"/>
               </a:rPr>
             </a:br>
-            <a:endParaRPr/>
+            <a:r>
+              <a:rPr lang="en" sz="1200">
+                <a:solidFill>
+                  <a:schemeClr val="accent5"/>
+                </a:solidFill>
+              </a:rPr>
+              <a:t>Chris C on Dev Edmonton Slack</a:t>
+            </a:r>
+            <a:r>
+              <a:rPr lang="en" sz="1200">
+                <a:solidFill>
+                  <a:schemeClr val="accent5"/>
+                </a:solidFill>
+              </a:rPr>
+              <a:t>				</a:t>
+            </a:r>
+            <a:br>
+              <a:rPr lang="en" sz="1200">
+                <a:solidFill>
+                  <a:schemeClr val="accent5"/>
+                </a:solidFill>
+              </a:rPr>
+            </a:br>
+            <a:endParaRPr sz="1200">
+              <a:solidFill>
+                <a:schemeClr val="accent5"/>
+              </a:solidFill>
+            </a:endParaRPr>
+          </a:p>
+          <a:p>
+            <a:pPr indent="0" lvl="0" marL="0" rtl="0" algn="l">
+              <a:lnSpc>
+                <a:spcPct val="133333"/>
+              </a:lnSpc>
+              <a:spcBef>
+                <a:spcPts val="1500"/>
+              </a:spcBef>
+              <a:spcAft>
+                <a:spcPts val="800"/>
+              </a:spcAft>
+              <a:buNone/>
+            </a:pPr>
+            <a:r>
+              <a:t/>
+            </a:r>
+            <a:endParaRPr sz="1200">
+              <a:solidFill>
+                <a:schemeClr val="accent5"/>
+              </a:solidFill>
+            </a:endParaRPr>
           </a:p>
         </p:txBody>
       </p:sp>
       <p:pic>
         <p:nvPicPr>
-          <p:cNvPr id="107" name="Google Shape;107;p19"/>
+          <p:cNvPr id="111" name="Google Shape;111;p19"/>
           <p:cNvPicPr preferRelativeResize="0"/>
           <p:nvPr/>
         </p:nvPicPr>
         <p:blipFill>
-          <a:blip r:embed="rId6">
+          <a:blip r:embed="rId7">
             <a:alphaModFix/>
           </a:blip>
           <a:stretch>
@@ -8955,7 +9212,7 @@
         </p:blipFill>
         <p:spPr>
           <a:xfrm>
-            <a:off x="5655400" y="1497325"/>
+            <a:off x="5820913" y="384700"/>
             <a:ext cx="2700125" cy="828050"/>
           </a:xfrm>
           <a:prstGeom prst="rect">
@@ -8969,12 +9226,12 @@
       </p:pic>
       <p:pic>
         <p:nvPicPr>
-          <p:cNvPr id="108" name="Google Shape;108;p19"/>
+          <p:cNvPr id="112" name="Google Shape;112;p19"/>
           <p:cNvPicPr preferRelativeResize="0"/>
           <p:nvPr/>
         </p:nvPicPr>
         <p:blipFill>
-          <a:blip r:embed="rId7">
+          <a:blip r:embed="rId8">
             <a:alphaModFix/>
           </a:blip>
           <a:stretch>
@@ -8983,7 +9240,7 @@
         </p:blipFill>
         <p:spPr>
           <a:xfrm>
-            <a:off x="3651000" y="3485825"/>
+            <a:off x="8045800" y="2493425"/>
             <a:ext cx="528800" cy="528800"/>
           </a:xfrm>
           <a:prstGeom prst="rect">
@@ -9004,6 +9261,285 @@
 </file>
 
 <file path=ppt/theme/theme1.xml><?xml version="1.0" encoding="utf-8"?>
+<a:theme xmlns:a="http://schemas.openxmlformats.org/drawingml/2006/main" xmlns:r="http://schemas.openxmlformats.org/officeDocument/2006/relationships">
+  <a:themeElements>
+    <a:clrScheme name="Default">
+      <a:dk1>
+        <a:srgbClr val="000000"/>
+      </a:dk1>
+      <a:lt1>
+        <a:srgbClr val="FFFFFF"/>
+      </a:lt1>
+      <a:dk2>
+        <a:srgbClr val="158158"/>
+      </a:dk2>
+      <a:lt2>
+        <a:srgbClr val="F3F3F3"/>
+      </a:lt2>
+      <a:accent1>
+        <a:srgbClr val="058DC7"/>
+      </a:accent1>
+      <a:accent2>
+        <a:srgbClr val="50B432"/>
+      </a:accent2>
+      <a:accent3>
+        <a:srgbClr val="ED561B"/>
+      </a:accent3>
+      <a:accent4>
+        <a:srgbClr val="EDEF00"/>
+      </a:accent4>
+      <a:accent5>
+        <a:srgbClr val="24CBE5"/>
+      </a:accent5>
+      <a:accent6>
+        <a:srgbClr val="64E572"/>
+      </a:accent6>
+      <a:hlink>
+        <a:srgbClr val="2200CC"/>
+      </a:hlink>
+      <a:folHlink>
+        <a:srgbClr val="551A8B"/>
+      </a:folHlink>
+    </a:clrScheme>
+    <a:fontScheme name="Office">
+      <a:majorFont>
+        <a:latin typeface="Arial"/>
+        <a:ea typeface=""/>
+        <a:cs typeface=""/>
+        <a:font script="Jpan" typeface="ＭＳ Ｐゴシック"/>
+        <a:font script="Hang" typeface="맑은 고딕"/>
+        <a:font script="Hans" typeface="宋体"/>
+        <a:font script="Hant" typeface="新細明體"/>
+        <a:font script="Arab" typeface="Times New Roman"/>
+        <a:font script="Hebr" typeface="Times New Roman"/>
+        <a:font script="Thai" typeface="Angsana New"/>
+        <a:font script="Ethi" typeface="Nyala"/>
+        <a:font script="Beng" typeface="Vrinda"/>
+        <a:font script="Gujr" typeface="Shruti"/>
+        <a:font script="Khmr" typeface="MoolBoran"/>
+        <a:font script="Knda" typeface="Tunga"/>
+        <a:font script="Guru" typeface="Raavi"/>
+        <a:font script="Cans" typeface="Euphemia"/>
+        <a:font script="Cher" typeface="Plantagenet Cherokee"/>
+        <a:font script="Yiii" typeface="Microsoft Yi Baiti"/>
+        <a:font script="Tibt" typeface="Microsoft Himalaya"/>
+        <a:font script="Thaa" typeface="MV Boli"/>
+        <a:font script="Deva" typeface="Mangal"/>
+        <a:font script="Telu" typeface="Gautami"/>
+        <a:font script="Taml" typeface="Latha"/>
+        <a:font script="Syrc" typeface="Estrangelo Edessa"/>
+        <a:font script="Orya" typeface="Kalinga"/>
+        <a:font script="Mlym" typeface="Kartika"/>
+        <a:font script="Laoo" typeface="DokChampa"/>
+        <a:font script="Sinh" typeface="Iskoola Pota"/>
+        <a:font script="Mong" typeface="Mongolian Baiti"/>
+        <a:font script="Viet" typeface="Times New Roman"/>
+        <a:font script="Uigh" typeface="Microsoft Uighur"/>
+        <a:font script="Geor" typeface="Sylfaen"/>
+      </a:majorFont>
+      <a:minorFont>
+        <a:latin typeface="Arial"/>
+        <a:ea typeface=""/>
+        <a:cs typeface=""/>
+        <a:font script="Jpan" typeface="ＭＳ Ｐゴシック"/>
+        <a:font script="Hang" typeface="맑은 고딕"/>
+        <a:font script="Hans" typeface="宋体"/>
+        <a:font script="Hant" typeface="新細明體"/>
+        <a:font script="Arab" typeface="Arial"/>
+        <a:font script="Hebr" typeface="Arial"/>
+        <a:font script="Thai" typeface="Cordia New"/>
+        <a:font script="Ethi" typeface="Nyala"/>
+        <a:font script="Beng" typeface="Vrinda"/>
+        <a:font script="Gujr" typeface="Shruti"/>
+        <a:font script="Khmr" typeface="DaunPenh"/>
+        <a:font script="Knda" typeface="Tunga"/>
+        <a:font script="Guru" typeface="Raavi"/>
+        <a:font script="Cans" typeface="Euphemia"/>
+        <a:font script="Cher" typeface="Plantagenet Cherokee"/>
+        <a:font script="Yiii" typeface="Microsoft Yi Baiti"/>
+        <a:font script="Tibt" typeface="Microsoft Himalaya"/>
+        <a:font script="Thaa" typeface="MV Boli"/>
+        <a:font script="Deva" typeface="Mangal"/>
+        <a:font script="Telu" typeface="Gautami"/>
+        <a:font script="Taml" typeface="Latha"/>
+        <a:font script="Syrc" typeface="Estrangelo Edessa"/>
+        <a:font script="Orya" typeface="Kalinga"/>
+        <a:font script="Mlym" typeface="Kartika"/>
+        <a:font script="Laoo" typeface="DokChampa"/>
+        <a:font script="Sinh" typeface="Iskoola Pota"/>
+        <a:font script="Mong" typeface="Mongolian Baiti"/>
+        <a:font script="Viet" typeface="Arial"/>
+        <a:font script="Uigh" typeface="Microsoft Uighur"/>
+        <a:font script="Geor" typeface="Sylfaen"/>
+      </a:minorFont>
+    </a:fontScheme>
+    <a:fmtScheme name="Office">
+      <a:fillStyleLst>
+        <a:solidFill>
+          <a:schemeClr val="phClr"/>
+        </a:solidFill>
+        <a:gradFill rotWithShape="1">
+          <a:gsLst>
+            <a:gs pos="0">
+              <a:schemeClr val="phClr">
+                <a:tint val="50000"/>
+                <a:satMod val="300000"/>
+              </a:schemeClr>
+            </a:gs>
+            <a:gs pos="35000">
+              <a:schemeClr val="phClr">
+                <a:tint val="37000"/>
+                <a:satMod val="300000"/>
+              </a:schemeClr>
+            </a:gs>
+            <a:gs pos="100000">
+              <a:schemeClr val="phClr">
+                <a:tint val="15000"/>
+                <a:satMod val="350000"/>
+              </a:schemeClr>
+            </a:gs>
+          </a:gsLst>
+          <a:lin ang="16200000" scaled="1"/>
+        </a:gradFill>
+        <a:gradFill rotWithShape="1">
+          <a:gsLst>
+            <a:gs pos="0">
+              <a:schemeClr val="phClr">
+                <a:tint val="100000"/>
+                <a:shade val="100000"/>
+                <a:satMod val="130000"/>
+              </a:schemeClr>
+            </a:gs>
+            <a:gs pos="100000">
+              <a:schemeClr val="phClr">
+                <a:tint val="50000"/>
+                <a:shade val="100000"/>
+                <a:satMod val="350000"/>
+              </a:schemeClr>
+            </a:gs>
+          </a:gsLst>
+          <a:lin ang="16200000" scaled="0"/>
+        </a:gradFill>
+      </a:fillStyleLst>
+      <a:lnStyleLst>
+        <a:ln w="9525" cap="flat" cmpd="sng" algn="ctr">
+          <a:solidFill>
+            <a:schemeClr val="phClr">
+              <a:shade val="95000"/>
+              <a:satMod val="105000"/>
+            </a:schemeClr>
+          </a:solidFill>
+          <a:prstDash val="solid"/>
+        </a:ln>
+        <a:ln w="25400" cap="flat" cmpd="sng" algn="ctr">
+          <a:solidFill>
+            <a:schemeClr val="phClr"/>
+          </a:solidFill>
+          <a:prstDash val="solid"/>
+        </a:ln>
+        <a:ln w="38100" cap="flat" cmpd="sng" algn="ctr">
+          <a:solidFill>
+            <a:schemeClr val="phClr"/>
+          </a:solidFill>
+          <a:prstDash val="solid"/>
+        </a:ln>
+      </a:lnStyleLst>
+      <a:effectStyleLst>
+        <a:effectStyle>
+          <a:effectLst>
+            <a:outerShdw blurRad="40000" dist="20000" dir="5400000" rotWithShape="0">
+              <a:srgbClr val="000000">
+                <a:alpha val="38000"/>
+              </a:srgbClr>
+            </a:outerShdw>
+          </a:effectLst>
+        </a:effectStyle>
+        <a:effectStyle>
+          <a:effectLst>
+            <a:outerShdw blurRad="40000" dist="23000" dir="5400000" rotWithShape="0">
+              <a:srgbClr val="000000">
+                <a:alpha val="35000"/>
+              </a:srgbClr>
+            </a:outerShdw>
+          </a:effectLst>
+        </a:effectStyle>
+        <a:effectStyle>
+          <a:effectLst>
+            <a:outerShdw blurRad="40000" dist="23000" dir="5400000" rotWithShape="0">
+              <a:srgbClr val="000000">
+                <a:alpha val="35000"/>
+              </a:srgbClr>
+            </a:outerShdw>
+          </a:effectLst>
+          <a:scene3d>
+            <a:camera prst="orthographicFront">
+              <a:rot lat="0" lon="0" rev="0"/>
+            </a:camera>
+            <a:lightRig rig="threePt" dir="t">
+              <a:rot lat="0" lon="0" rev="1200000"/>
+            </a:lightRig>
+          </a:scene3d>
+          <a:sp3d>
+            <a:bevelT w="63500" h="25400"/>
+          </a:sp3d>
+        </a:effectStyle>
+      </a:effectStyleLst>
+      <a:bgFillStyleLst>
+        <a:solidFill>
+          <a:schemeClr val="phClr"/>
+        </a:solidFill>
+        <a:gradFill rotWithShape="1">
+          <a:gsLst>
+            <a:gs pos="0">
+              <a:schemeClr val="phClr">
+                <a:tint val="40000"/>
+                <a:satMod val="350000"/>
+              </a:schemeClr>
+            </a:gs>
+            <a:gs pos="40000">
+              <a:schemeClr val="phClr">
+                <a:tint val="45000"/>
+                <a:shade val="99000"/>
+                <a:satMod val="350000"/>
+              </a:schemeClr>
+            </a:gs>
+            <a:gs pos="100000">
+              <a:schemeClr val="phClr">
+                <a:shade val="20000"/>
+                <a:satMod val="255000"/>
+              </a:schemeClr>
+            </a:gs>
+          </a:gsLst>
+          <a:path path="circle">
+            <a:fillToRect l="50000" t="-80000" r="50000" b="180000"/>
+          </a:path>
+        </a:gradFill>
+        <a:gradFill rotWithShape="1">
+          <a:gsLst>
+            <a:gs pos="0">
+              <a:schemeClr val="phClr">
+                <a:tint val="80000"/>
+                <a:satMod val="300000"/>
+              </a:schemeClr>
+            </a:gs>
+            <a:gs pos="100000">
+              <a:schemeClr val="phClr">
+                <a:shade val="30000"/>
+                <a:satMod val="200000"/>
+              </a:schemeClr>
+            </a:gs>
+          </a:gsLst>
+          <a:path path="circle">
+            <a:fillToRect l="50000" t="50000" r="50000" b="50000"/>
+          </a:path>
+        </a:gradFill>
+      </a:bgFillStyleLst>
+    </a:fmtScheme>
+  </a:themeElements>
+</a:theme>
+</file>
+
+<file path=ppt/theme/theme2.xml><?xml version="1.0" encoding="utf-8"?>
 <a:theme xmlns:a="http://schemas.openxmlformats.org/drawingml/2006/main" xmlns:r="http://schemas.openxmlformats.org/officeDocument/2006/relationships" name="Tropic">
   <a:themeElements>
     <a:clrScheme name="Tropic">
@@ -9280,283 +9816,4 @@
     </a:fmtScheme>
   </a:themeElements>
 </a:theme>
-</file>
-
-<file path=ppt/theme/theme2.xml><?xml version="1.0" encoding="utf-8"?>
-<a:theme xmlns:a="http://schemas.openxmlformats.org/drawingml/2006/main" xmlns:r="http://schemas.openxmlformats.org/officeDocument/2006/relationships">
-  <a:themeElements>
-    <a:clrScheme name="Default">
-      <a:dk1>
-        <a:srgbClr val="000000"/>
-      </a:dk1>
-      <a:lt1>
-        <a:srgbClr val="FFFFFF"/>
-      </a:lt1>
-      <a:dk2>
-        <a:srgbClr val="158158"/>
-      </a:dk2>
-      <a:lt2>
-        <a:srgbClr val="F3F3F3"/>
-      </a:lt2>
-      <a:accent1>
-        <a:srgbClr val="058DC7"/>
-      </a:accent1>
-      <a:accent2>
-        <a:srgbClr val="50B432"/>
-      </a:accent2>
-      <a:accent3>
-        <a:srgbClr val="ED561B"/>
-      </a:accent3>
-      <a:accent4>
-        <a:srgbClr val="EDEF00"/>
-      </a:accent4>
-      <a:accent5>
-        <a:srgbClr val="24CBE5"/>
-      </a:accent5>
-      <a:accent6>
-        <a:srgbClr val="64E572"/>
-      </a:accent6>
-      <a:hlink>
-        <a:srgbClr val="2200CC"/>
-      </a:hlink>
-      <a:folHlink>
-        <a:srgbClr val="551A8B"/>
-      </a:folHlink>
-    </a:clrScheme>
-    <a:fontScheme name="Office">
-      <a:majorFont>
-        <a:latin typeface="Arial"/>
-        <a:ea typeface=""/>
-        <a:cs typeface=""/>
-        <a:font script="Jpan" typeface="ＭＳ Ｐゴシック"/>
-        <a:font script="Hang" typeface="맑은 고딕"/>
-        <a:font script="Hans" typeface="宋体"/>
-        <a:font script="Hant" typeface="新細明體"/>
-        <a:font script="Arab" typeface="Times New Roman"/>
-        <a:font script="Hebr" typeface="Times New Roman"/>
-        <a:font script="Thai" typeface="Angsana New"/>
-        <a:font script="Ethi" typeface="Nyala"/>
-        <a:font script="Beng" typeface="Vrinda"/>
-        <a:font script="Gujr" typeface="Shruti"/>
-        <a:font script="Khmr" typeface="MoolBoran"/>
-        <a:font script="Knda" typeface="Tunga"/>
-        <a:font script="Guru" typeface="Raavi"/>
-        <a:font script="Cans" typeface="Euphemia"/>
-        <a:font script="Cher" typeface="Plantagenet Cherokee"/>
-        <a:font script="Yiii" typeface="Microsoft Yi Baiti"/>
-        <a:font script="Tibt" typeface="Microsoft Himalaya"/>
-        <a:font script="Thaa" typeface="MV Boli"/>
-        <a:font script="Deva" typeface="Mangal"/>
-        <a:font script="Telu" typeface="Gautami"/>
-        <a:font script="Taml" typeface="Latha"/>
-        <a:font script="Syrc" typeface="Estrangelo Edessa"/>
-        <a:font script="Orya" typeface="Kalinga"/>
-        <a:font script="Mlym" typeface="Kartika"/>
-        <a:font script="Laoo" typeface="DokChampa"/>
-        <a:font script="Sinh" typeface="Iskoola Pota"/>
-        <a:font script="Mong" typeface="Mongolian Baiti"/>
-        <a:font script="Viet" typeface="Times New Roman"/>
-        <a:font script="Uigh" typeface="Microsoft Uighur"/>
-        <a:font script="Geor" typeface="Sylfaen"/>
-      </a:majorFont>
-      <a:minorFont>
-        <a:latin typeface="Arial"/>
-        <a:ea typeface=""/>
-        <a:cs typeface=""/>
-        <a:font script="Jpan" typeface="ＭＳ Ｐゴシック"/>
-        <a:font script="Hang" typeface="맑은 고딕"/>
-        <a:font script="Hans" typeface="宋体"/>
-        <a:font script="Hant" typeface="新細明體"/>
-        <a:font script="Arab" typeface="Arial"/>
-        <a:font script="Hebr" typeface="Arial"/>
-        <a:font script="Thai" typeface="Cordia New"/>
-        <a:font script="Ethi" typeface="Nyala"/>
-        <a:font script="Beng" typeface="Vrinda"/>
-        <a:font script="Gujr" typeface="Shruti"/>
-        <a:font script="Khmr" typeface="DaunPenh"/>
-        <a:font script="Knda" typeface="Tunga"/>
-        <a:font script="Guru" typeface="Raavi"/>
-        <a:font script="Cans" typeface="Euphemia"/>
-        <a:font script="Cher" typeface="Plantagenet Cherokee"/>
-        <a:font script="Yiii" typeface="Microsoft Yi Baiti"/>
-        <a:font script="Tibt" typeface="Microsoft Himalaya"/>
-        <a:font script="Thaa" typeface="MV Boli"/>
-        <a:font script="Deva" typeface="Mangal"/>
-        <a:font script="Telu" typeface="Gautami"/>
-        <a:font script="Taml" typeface="Latha"/>
-        <a:font script="Syrc" typeface="Estrangelo Edessa"/>
-        <a:font script="Orya" typeface="Kalinga"/>
-        <a:font script="Mlym" typeface="Kartika"/>
-        <a:font script="Laoo" typeface="DokChampa"/>
-        <a:font script="Sinh" typeface="Iskoola Pota"/>
-        <a:font script="Mong" typeface="Mongolian Baiti"/>
-        <a:font script="Viet" typeface="Arial"/>
-        <a:font script="Uigh" typeface="Microsoft Uighur"/>
-        <a:font script="Geor" typeface="Sylfaen"/>
-      </a:minorFont>
-    </a:fontScheme>
-    <a:fmtScheme name="Office">
-      <a:fillStyleLst>
-        <a:solidFill>
-          <a:schemeClr val="phClr"/>
-        </a:solidFill>
-        <a:gradFill rotWithShape="1">
-          <a:gsLst>
-            <a:gs pos="0">
-              <a:schemeClr val="phClr">
-                <a:tint val="50000"/>
-                <a:satMod val="300000"/>
-              </a:schemeClr>
-            </a:gs>
-            <a:gs pos="35000">
-              <a:schemeClr val="phClr">
-                <a:tint val="37000"/>
-                <a:satMod val="300000"/>
-              </a:schemeClr>
-            </a:gs>
-            <a:gs pos="100000">
-              <a:schemeClr val="phClr">
-                <a:tint val="15000"/>
-                <a:satMod val="350000"/>
-              </a:schemeClr>
-            </a:gs>
-          </a:gsLst>
-          <a:lin ang="16200000" scaled="1"/>
-        </a:gradFill>
-        <a:gradFill rotWithShape="1">
-          <a:gsLst>
-            <a:gs pos="0">
-              <a:schemeClr val="phClr">
-                <a:tint val="100000"/>
-                <a:shade val="100000"/>
-                <a:satMod val="130000"/>
-              </a:schemeClr>
-            </a:gs>
-            <a:gs pos="100000">
-              <a:schemeClr val="phClr">
-                <a:tint val="50000"/>
-                <a:shade val="100000"/>
-                <a:satMod val="350000"/>
-              </a:schemeClr>
-            </a:gs>
-          </a:gsLst>
-          <a:lin ang="16200000" scaled="0"/>
-        </a:gradFill>
-      </a:fillStyleLst>
-      <a:lnStyleLst>
-        <a:ln w="9525" cap="flat" cmpd="sng" algn="ctr">
-          <a:solidFill>
-            <a:schemeClr val="phClr">
-              <a:shade val="95000"/>
-              <a:satMod val="105000"/>
-            </a:schemeClr>
-          </a:solidFill>
-          <a:prstDash val="solid"/>
-        </a:ln>
-        <a:ln w="25400" cap="flat" cmpd="sng" algn="ctr">
-          <a:solidFill>
-            <a:schemeClr val="phClr"/>
-          </a:solidFill>
-          <a:prstDash val="solid"/>
-        </a:ln>
-        <a:ln w="38100" cap="flat" cmpd="sng" algn="ctr">
-          <a:solidFill>
-            <a:schemeClr val="phClr"/>
-          </a:solidFill>
-          <a:prstDash val="solid"/>
-        </a:ln>
-      </a:lnStyleLst>
-      <a:effectStyleLst>
-        <a:effectStyle>
-          <a:effectLst>
-            <a:outerShdw blurRad="40000" dist="20000" dir="5400000" rotWithShape="0">
-              <a:srgbClr val="000000">
-                <a:alpha val="38000"/>
-              </a:srgbClr>
-            </a:outerShdw>
-          </a:effectLst>
-        </a:effectStyle>
-        <a:effectStyle>
-          <a:effectLst>
-            <a:outerShdw blurRad="40000" dist="23000" dir="5400000" rotWithShape="0">
-              <a:srgbClr val="000000">
-                <a:alpha val="35000"/>
-              </a:srgbClr>
-            </a:outerShdw>
-          </a:effectLst>
-        </a:effectStyle>
-        <a:effectStyle>
-          <a:effectLst>
-            <a:outerShdw blurRad="40000" dist="23000" dir="5400000" rotWithShape="0">
-              <a:srgbClr val="000000">
-                <a:alpha val="35000"/>
-              </a:srgbClr>
-            </a:outerShdw>
-          </a:effectLst>
-          <a:scene3d>
-            <a:camera prst="orthographicFront">
-              <a:rot lat="0" lon="0" rev="0"/>
-            </a:camera>
-            <a:lightRig rig="threePt" dir="t">
-              <a:rot lat="0" lon="0" rev="1200000"/>
-            </a:lightRig>
-          </a:scene3d>
-          <a:sp3d>
-            <a:bevelT w="63500" h="25400"/>
-          </a:sp3d>
-        </a:effectStyle>
-      </a:effectStyleLst>
-      <a:bgFillStyleLst>
-        <a:solidFill>
-          <a:schemeClr val="phClr"/>
-        </a:solidFill>
-        <a:gradFill rotWithShape="1">
-          <a:gsLst>
-            <a:gs pos="0">
-              <a:schemeClr val="phClr">
-                <a:tint val="40000"/>
-                <a:satMod val="350000"/>
-              </a:schemeClr>
-            </a:gs>
-            <a:gs pos="40000">
-              <a:schemeClr val="phClr">
-                <a:tint val="45000"/>
-                <a:shade val="99000"/>
-                <a:satMod val="350000"/>
-              </a:schemeClr>
-            </a:gs>
-            <a:gs pos="100000">
-              <a:schemeClr val="phClr">
-                <a:shade val="20000"/>
-                <a:satMod val="255000"/>
-              </a:schemeClr>
-            </a:gs>
-          </a:gsLst>
-          <a:path path="circle">
-            <a:fillToRect l="50000" t="-80000" r="50000" b="180000"/>
-          </a:path>
-        </a:gradFill>
-        <a:gradFill rotWithShape="1">
-          <a:gsLst>
-            <a:gs pos="0">
-              <a:schemeClr val="phClr">
-                <a:tint val="80000"/>
-                <a:satMod val="300000"/>
-              </a:schemeClr>
-            </a:gs>
-            <a:gs pos="100000">
-              <a:schemeClr val="phClr">
-                <a:shade val="30000"/>
-                <a:satMod val="200000"/>
-              </a:schemeClr>
-            </a:gs>
-          </a:gsLst>
-          <a:path path="circle">
-            <a:fillToRect l="50000" t="50000" r="50000" b="50000"/>
-          </a:path>
-        </a:gradFill>
-      </a:bgFillStyleLst>
-    </a:fmtScheme>
-  </a:themeElements>
-</a:theme>
 </file>
</xml_diff>